<commit_message>
Adding enhancements for W8.2 - Data Cleansing
</commit_message>
<xml_diff>
--- a/Harrison Lucas repos/LDSBC_BA280_DA-HL/ppt_files/Hass Avocado Dashboard.pptxLDSBC_BA280_W6_Hass_Avocado_Dashboard_HL.pptx
+++ b/Harrison Lucas repos/LDSBC_BA280_DA-HL/ppt_files/Hass Avocado Dashboard.pptxLDSBC_BA280_W6_Hass_Avocado_Dashboard_HL.pptx
@@ -5,15 +5,16 @@
     <p:sldMasterId id="2147483660" r:id="rId4"/>
   </p:sldMasterIdLst>
   <p:notesMasterIdLst>
-    <p:notesMasterId r:id="rId11"/>
+    <p:notesMasterId r:id="rId12"/>
   </p:notesMasterIdLst>
   <p:sldIdLst>
     <p:sldId id="278" r:id="rId5"/>
-    <p:sldId id="282" r:id="rId6"/>
-    <p:sldId id="279" r:id="rId7"/>
-    <p:sldId id="280" r:id="rId8"/>
-    <p:sldId id="281" r:id="rId9"/>
-    <p:sldId id="284" r:id="rId10"/>
+    <p:sldId id="279" r:id="rId6"/>
+    <p:sldId id="282" r:id="rId7"/>
+    <p:sldId id="285" r:id="rId8"/>
+    <p:sldId id="284" r:id="rId9"/>
+    <p:sldId id="280" r:id="rId10"/>
+    <p:sldId id="281" r:id="rId11"/>
   </p:sldIdLst>
   <p:sldSz cx="12192000" cy="6858000"/>
   <p:notesSz cx="6858000" cy="9144000"/>
@@ -202,7 +203,7 @@
           <a:p>
             <a:fld id="{AFD01546-198A-4195-BCF8-F0FF54C90E5E}" type="datetimeFigureOut">
               <a:rPr lang="en-US" smtClean="0"/>
-              <a:t>2/20/2021</a:t>
+              <a:t>2/24/2021</a:t>
             </a:fld>
             <a:endParaRPr lang="en-US" dirty="0"/>
           </a:p>
@@ -603,7 +604,7 @@
     </p:spTree>
     <p:extLst>
       <p:ext uri="{BB962C8B-B14F-4D97-AF65-F5344CB8AC3E}">
-        <p14:creationId xmlns:p14="http://schemas.microsoft.com/office/powerpoint/2010/main" val="3754190352"/>
+        <p14:creationId xmlns:p14="http://schemas.microsoft.com/office/powerpoint/2010/main" val="457847550"/>
       </p:ext>
     </p:extLst>
   </p:cSld>
@@ -747,7 +748,7 @@
     </p:spTree>
     <p:extLst>
       <p:ext uri="{BB962C8B-B14F-4D97-AF65-F5344CB8AC3E}">
-        <p14:creationId xmlns:p14="http://schemas.microsoft.com/office/powerpoint/2010/main" val="457847550"/>
+        <p14:creationId xmlns:p14="http://schemas.microsoft.com/office/powerpoint/2010/main" val="3754190352"/>
       </p:ext>
     </p:extLst>
   </p:cSld>
@@ -891,7 +892,7 @@
     </p:spTree>
     <p:extLst>
       <p:ext uri="{BB962C8B-B14F-4D97-AF65-F5344CB8AC3E}">
-        <p14:creationId xmlns:p14="http://schemas.microsoft.com/office/powerpoint/2010/main" val="3194864948"/>
+        <p14:creationId xmlns:p14="http://schemas.microsoft.com/office/powerpoint/2010/main" val="932979651"/>
       </p:ext>
     </p:extLst>
   </p:cSld>
@@ -1035,7 +1036,7 @@
     </p:spTree>
     <p:extLst>
       <p:ext uri="{BB962C8B-B14F-4D97-AF65-F5344CB8AC3E}">
-        <p14:creationId xmlns:p14="http://schemas.microsoft.com/office/powerpoint/2010/main" val="17983116"/>
+        <p14:creationId xmlns:p14="http://schemas.microsoft.com/office/powerpoint/2010/main" val="2603267345"/>
       </p:ext>
     </p:extLst>
   </p:cSld>
@@ -1179,7 +1180,151 @@
     </p:spTree>
     <p:extLst>
       <p:ext uri="{BB962C8B-B14F-4D97-AF65-F5344CB8AC3E}">
-        <p14:creationId xmlns:p14="http://schemas.microsoft.com/office/powerpoint/2010/main" val="2603267345"/>
+        <p14:creationId xmlns:p14="http://schemas.microsoft.com/office/powerpoint/2010/main" val="3194864948"/>
+      </p:ext>
+    </p:extLst>
+  </p:cSld>
+  <p:clrMapOvr>
+    <a:masterClrMapping/>
+  </p:clrMapOvr>
+</p:notes>
+</file>
+
+<file path=ppt/notesSlides/notesSlide6.xml><?xml version="1.0" encoding="utf-8"?>
+<p:notes xmlns:a="http://schemas.openxmlformats.org/drawingml/2006/main" xmlns:r="http://schemas.openxmlformats.org/officeDocument/2006/relationships" xmlns:p="http://schemas.openxmlformats.org/presentationml/2006/main">
+  <p:cSld>
+    <p:spTree>
+      <p:nvGrpSpPr>
+        <p:cNvPr id="1" name=""/>
+        <p:cNvGrpSpPr/>
+        <p:nvPr/>
+      </p:nvGrpSpPr>
+      <p:grpSpPr>
+        <a:xfrm>
+          <a:off x="0" y="0"/>
+          <a:ext cx="0" cy="0"/>
+          <a:chOff x="0" y="0"/>
+          <a:chExt cx="0" cy="0"/>
+        </a:xfrm>
+      </p:grpSpPr>
+      <p:sp>
+        <p:nvSpPr>
+          <p:cNvPr id="2" name="Slide Image Placeholder 1"/>
+          <p:cNvSpPr>
+            <a:spLocks noGrp="1" noRot="1" noChangeAspect="1"/>
+          </p:cNvSpPr>
+          <p:nvPr>
+            <p:ph type="sldImg"/>
+          </p:nvPr>
+        </p:nvSpPr>
+        <p:spPr/>
+      </p:sp>
+      <p:sp>
+        <p:nvSpPr>
+          <p:cNvPr id="3" name="Notes Placeholder 2"/>
+          <p:cNvSpPr>
+            <a:spLocks noGrp="1"/>
+          </p:cNvSpPr>
+          <p:nvPr>
+            <p:ph type="body" idx="1"/>
+          </p:nvPr>
+        </p:nvSpPr>
+        <p:spPr/>
+        <p:txBody>
+          <a:bodyPr/>
+          <a:lstStyle/>
+          <a:p>
+            <a:endParaRPr lang="en-US" dirty="0"/>
+          </a:p>
+        </p:txBody>
+      </p:sp>
+      <p:sp>
+        <p:nvSpPr>
+          <p:cNvPr id="4" name="Slide Number Placeholder 3"/>
+          <p:cNvSpPr>
+            <a:spLocks noGrp="1"/>
+          </p:cNvSpPr>
+          <p:nvPr>
+            <p:ph type="sldNum" sz="quarter" idx="5"/>
+          </p:nvPr>
+        </p:nvSpPr>
+        <p:spPr/>
+        <p:txBody>
+          <a:bodyPr/>
+          <a:lstStyle/>
+          <a:p>
+            <a:pPr marL="0" marR="0" lvl="0" indent="0" algn="r" defTabSz="914400" rtl="0" eaLnBrk="1" fontAlgn="auto" latinLnBrk="0" hangingPunct="1">
+              <a:lnSpc>
+                <a:spcPct val="100000"/>
+              </a:lnSpc>
+              <a:spcBef>
+                <a:spcPts val="0"/>
+              </a:spcBef>
+              <a:spcAft>
+                <a:spcPts val="0"/>
+              </a:spcAft>
+              <a:buClrTx/>
+              <a:buSzTx/>
+              <a:buFontTx/>
+              <a:buNone/>
+              <a:tabLst/>
+              <a:defRPr/>
+            </a:pPr>
+            <a:fld id="{33AEA074-24A7-4657-AE02-A51F68EA6AA2}" type="slidenum">
+              <a:rPr kumimoji="0" lang="en-US" sz="1200" b="0" i="0" u="none" strike="noStrike" kern="1200" cap="none" spc="0" normalizeH="0" baseline="0" noProof="0" smtClean="0">
+                <a:ln>
+                  <a:noFill/>
+                </a:ln>
+                <a:solidFill>
+                  <a:prstClr val="black"/>
+                </a:solidFill>
+                <a:effectLst/>
+                <a:uLnTx/>
+                <a:uFillTx/>
+                <a:latin typeface="Calibri" panose="020F0502020204030204"/>
+                <a:ea typeface="+mn-ea"/>
+                <a:cs typeface="+mn-cs"/>
+              </a:rPr>
+              <a:pPr marL="0" marR="0" lvl="0" indent="0" algn="r" defTabSz="914400" rtl="0" eaLnBrk="1" fontAlgn="auto" latinLnBrk="0" hangingPunct="1">
+                <a:lnSpc>
+                  <a:spcPct val="100000"/>
+                </a:lnSpc>
+                <a:spcBef>
+                  <a:spcPts val="0"/>
+                </a:spcBef>
+                <a:spcAft>
+                  <a:spcPts val="0"/>
+                </a:spcAft>
+                <a:buClrTx/>
+                <a:buSzTx/>
+                <a:buFontTx/>
+                <a:buNone/>
+                <a:tabLst/>
+                <a:defRPr/>
+              </a:pPr>
+              <a:t>7</a:t>
+            </a:fld>
+            <a:endParaRPr kumimoji="0" lang="en-US" sz="1200" b="0" i="0" u="none" strike="noStrike" kern="1200" cap="none" spc="0" normalizeH="0" baseline="0" noProof="0" dirty="0">
+              <a:ln>
+                <a:noFill/>
+              </a:ln>
+              <a:solidFill>
+                <a:prstClr val="black"/>
+              </a:solidFill>
+              <a:effectLst/>
+              <a:uLnTx/>
+              <a:uFillTx/>
+              <a:latin typeface="Calibri" panose="020F0502020204030204"/>
+              <a:ea typeface="+mn-ea"/>
+              <a:cs typeface="+mn-cs"/>
+            </a:endParaRPr>
+          </a:p>
+        </p:txBody>
+      </p:sp>
+    </p:spTree>
+    <p:extLst>
+      <p:ext uri="{BB962C8B-B14F-4D97-AF65-F5344CB8AC3E}">
+        <p14:creationId xmlns:p14="http://schemas.microsoft.com/office/powerpoint/2010/main" val="17983116"/>
       </p:ext>
     </p:extLst>
   </p:cSld>
@@ -1374,7 +1519,7 @@
           <a:p>
             <a:fld id="{88D38747-4367-4BD2-8D51-C97E202738E2}" type="datetime1">
               <a:rPr lang="en-US" smtClean="0"/>
-              <a:t>2/20/2021</a:t>
+              <a:t>2/24/2021</a:t>
             </a:fld>
             <a:endParaRPr lang="en-US" dirty="0"/>
           </a:p>
@@ -1679,7 +1824,7 @@
           <a:p>
             <a:fld id="{11F1B079-7EF0-44EE-B798-BCC497C9F3B2}" type="datetime1">
               <a:rPr lang="en-US" smtClean="0"/>
-              <a:t>2/20/2021</a:t>
+              <a:t>2/24/2021</a:t>
             </a:fld>
             <a:endParaRPr lang="en-US" dirty="0"/>
           </a:p>
@@ -1873,7 +2018,7 @@
           <a:p>
             <a:fld id="{28FF70A8-1D13-4657-95F0-A9EA54967B8D}" type="datetime1">
               <a:rPr lang="en-US" smtClean="0"/>
-              <a:t>2/20/2021</a:t>
+              <a:t>2/24/2021</a:t>
             </a:fld>
             <a:endParaRPr lang="en-US" dirty="0"/>
           </a:p>
@@ -2136,7 +2281,7 @@
           <a:p>
             <a:fld id="{21EB90AC-71BD-4C7F-8ACA-7B3F18292E63}" type="datetime1">
               <a:rPr lang="en-US" smtClean="0"/>
-              <a:t>2/20/2021</a:t>
+              <a:t>2/24/2021</a:t>
             </a:fld>
             <a:endParaRPr lang="en-US" dirty="0"/>
           </a:p>
@@ -2572,7 +2717,7 @@
           <a:p>
             <a:fld id="{4E6EFC2C-8905-46F0-B443-CE905B76BA01}" type="datetime1">
               <a:rPr lang="en-US" smtClean="0"/>
-              <a:t>2/20/2021</a:t>
+              <a:t>2/24/2021</a:t>
             </a:fld>
             <a:endParaRPr lang="en-US" dirty="0"/>
           </a:p>
@@ -3109,7 +3254,7 @@
           <a:p>
             <a:fld id="{D9079DC3-C9B5-499E-9140-0DC28B7074E2}" type="datetime1">
               <a:rPr lang="en-US" smtClean="0"/>
-              <a:t>2/20/2021</a:t>
+              <a:t>2/24/2021</a:t>
             </a:fld>
             <a:endParaRPr lang="en-US" dirty="0"/>
           </a:p>
@@ -3991,7 +4136,7 @@
           <a:p>
             <a:fld id="{30BB33EA-E472-4D22-9C03-A9C14AA21CED}" type="datetime1">
               <a:rPr lang="en-US" smtClean="0"/>
-              <a:t>2/20/2021</a:t>
+              <a:t>2/24/2021</a:t>
             </a:fld>
             <a:endParaRPr lang="en-US" dirty="0"/>
           </a:p>
@@ -4161,7 +4306,7 @@
           <a:p>
             <a:fld id="{73C55A3C-5767-4844-A0A3-83778C2E5409}" type="datetime1">
               <a:rPr lang="en-US" smtClean="0"/>
-              <a:t>2/20/2021</a:t>
+              <a:t>2/24/2021</a:t>
             </a:fld>
             <a:endParaRPr lang="en-US" dirty="0"/>
           </a:p>
@@ -4405,7 +4550,7 @@
           <a:p>
             <a:fld id="{CAE507A8-A5CF-4D38-AB86-7EDDA87A85D4}" type="datetime1">
               <a:rPr lang="en-US" smtClean="0"/>
-              <a:t>2/20/2021</a:t>
+              <a:t>2/24/2021</a:t>
             </a:fld>
             <a:endParaRPr lang="en-US" dirty="0"/>
           </a:p>
@@ -4647,7 +4792,7 @@
           <a:p>
             <a:fld id="{BDFCD27C-8599-43EF-BA1D-14DDC1946E06}" type="datetime1">
               <a:rPr lang="en-US" smtClean="0"/>
-              <a:t>2/20/2021</a:t>
+              <a:t>2/24/2021</a:t>
             </a:fld>
             <a:endParaRPr lang="en-US" dirty="0"/>
           </a:p>
@@ -5130,7 +5275,7 @@
           <a:p>
             <a:fld id="{49343D99-809A-49C0-96E5-4250D0B498EE}" type="datetime1">
               <a:rPr lang="en-US" smtClean="0"/>
-              <a:t>2/20/2021</a:t>
+              <a:t>2/24/2021</a:t>
             </a:fld>
             <a:endParaRPr lang="en-US" dirty="0"/>
           </a:p>
@@ -5248,7 +5393,7 @@
           <a:p>
             <a:fld id="{A143DE9B-B678-4EFB-BB7D-A4370204A0B0}" type="datetime1">
               <a:rPr lang="en-US" smtClean="0"/>
-              <a:t>2/20/2021</a:t>
+              <a:t>2/24/2021</a:t>
             </a:fld>
             <a:endParaRPr lang="en-US" dirty="0"/>
           </a:p>
@@ -5343,7 +5488,7 @@
           <a:p>
             <a:fld id="{E68812DA-F765-4142-A6A3-A8ED7235E082}" type="datetime1">
               <a:rPr lang="en-US" smtClean="0"/>
-              <a:t>2/20/2021</a:t>
+              <a:t>2/24/2021</a:t>
             </a:fld>
             <a:endParaRPr lang="en-US" dirty="0"/>
           </a:p>
@@ -5598,7 +5743,7 @@
           <a:p>
             <a:fld id="{3E0277FD-7DE6-41D4-930D-AC99F5AFE54E}" type="datetime1">
               <a:rPr lang="en-US" smtClean="0"/>
-              <a:t>2/20/2021</a:t>
+              <a:t>2/24/2021</a:t>
             </a:fld>
             <a:endParaRPr lang="en-US" dirty="0"/>
           </a:p>
@@ -5905,7 +6050,7 @@
           <a:p>
             <a:fld id="{9EA15526-7079-4B7B-987C-1B5FAE11A0FF}" type="datetime1">
               <a:rPr lang="en-US" smtClean="0"/>
-              <a:t>2/20/2021</a:t>
+              <a:t>2/24/2021</a:t>
             </a:fld>
             <a:endParaRPr lang="en-US" dirty="0"/>
           </a:p>
@@ -6140,7 +6285,7 @@
           <a:p>
             <a:fld id="{073ED0CC-082F-4160-86E5-0D6041F12778}" type="datetime1">
               <a:rPr lang="en-US" smtClean="0"/>
-              <a:t>2/20/2021</a:t>
+              <a:t>2/24/2021</a:t>
             </a:fld>
             <a:endParaRPr lang="en-US" dirty="0"/>
           </a:p>
@@ -7058,7 +7203,7 @@
           </a:effectLst>
           <a:extLst>
             <a:ext uri="{91240B29-F687-4f45-9708-019B960494DF}">
-              <a14:hiddenLine xmlns:a16="http://schemas.microsoft.com/office/drawing/2014/main" xmlns:p14="http://schemas.microsoft.com/office/powerpoint/2010/main" xmlns:a14="http://schemas.microsoft.com/office/drawing/2010/main" xmlns="" w="9525">
+              <a14:hiddenLine xmlns="" xmlns:a14="http://schemas.microsoft.com/office/drawing/2010/main" xmlns:p14="http://schemas.microsoft.com/office/powerpoint/2010/main" xmlns:a16="http://schemas.microsoft.com/office/drawing/2014/main" w="9525">
                 <a:solidFill>
                   <a:srgbClr val="000000"/>
                 </a:solidFill>
@@ -7198,6 +7343,743 @@
 </file>
 
 <file path=ppt/slides/slide2.xml><?xml version="1.0" encoding="utf-8"?>
+<p:sld xmlns:a="http://schemas.openxmlformats.org/drawingml/2006/main" xmlns:r="http://schemas.openxmlformats.org/officeDocument/2006/relationships" xmlns:p="http://schemas.openxmlformats.org/presentationml/2006/main">
+  <p:cSld>
+    <p:bg>
+      <p:bgPr>
+        <a:blipFill rotWithShape="1">
+          <a:blip r:embed="rId4">
+            <a:duotone>
+              <a:schemeClr val="bg1">
+                <a:shade val="80000"/>
+                <a:lumMod val="80000"/>
+              </a:schemeClr>
+              <a:schemeClr val="bg1">
+                <a:tint val="98000"/>
+              </a:schemeClr>
+            </a:duotone>
+          </a:blip>
+          <a:stretch/>
+        </a:blipFill>
+        <a:effectLst/>
+      </p:bgPr>
+    </p:bg>
+    <p:spTree>
+      <p:nvGrpSpPr>
+        <p:cNvPr id="1" name=""/>
+        <p:cNvGrpSpPr/>
+        <p:nvPr/>
+      </p:nvGrpSpPr>
+      <p:grpSpPr>
+        <a:xfrm>
+          <a:off x="0" y="0"/>
+          <a:ext cx="0" cy="0"/>
+          <a:chOff x="0" y="0"/>
+          <a:chExt cx="0" cy="0"/>
+        </a:xfrm>
+      </p:grpSpPr>
+      <p:sp>
+        <p:nvSpPr>
+          <p:cNvPr id="62" name="Rectangle 61">
+            <a:extLst>
+              <a:ext uri="{FF2B5EF4-FFF2-40B4-BE49-F238E27FC236}">
+                <a16:creationId xmlns:a16="http://schemas.microsoft.com/office/drawing/2014/main" id="{98761467-7640-47B1-90D4-04ADAD632C96}"/>
+              </a:ext>
+              <a:ext uri="{C183D7F6-B498-43B3-948B-1728B52AA6E4}">
+                <adec:decorative xmlns:adec="http://schemas.microsoft.com/office/drawing/2017/decorative" val="1"/>
+              </a:ext>
+            </a:extLst>
+          </p:cNvPr>
+          <p:cNvSpPr>
+            <a:spLocks noGrp="1" noRot="1" noChangeAspect="1" noMove="1" noResize="1" noEditPoints="1" noAdjustHandles="1" noChangeArrowheads="1" noChangeShapeType="1" noTextEdit="1"/>
+          </p:cNvSpPr>
+          <p:nvPr>
+            <p:extLst>
+              <p:ext uri="{386F3935-93C4-4BCD-93E2-E3B085C9AB24}">
+                <p16:designElem xmlns:p16="http://schemas.microsoft.com/office/powerpoint/2015/main" val="1"/>
+              </p:ext>
+            </p:extLst>
+          </p:nvPr>
+        </p:nvSpPr>
+        <p:spPr>
+          <a:xfrm>
+            <a:off x="0" y="0"/>
+            <a:ext cx="12192000" cy="6858000"/>
+          </a:xfrm>
+          <a:prstGeom prst="rect">
+            <a:avLst/>
+          </a:prstGeom>
+          <a:solidFill>
+            <a:schemeClr val="bg1">
+              <a:lumMod val="85000"/>
+              <a:lumOff val="15000"/>
+            </a:schemeClr>
+          </a:solidFill>
+          <a:ln>
+            <a:noFill/>
+          </a:ln>
+        </p:spPr>
+        <p:style>
+          <a:lnRef idx="2">
+            <a:schemeClr val="accent1">
+              <a:shade val="50000"/>
+            </a:schemeClr>
+          </a:lnRef>
+          <a:fillRef idx="1">
+            <a:schemeClr val="accent1"/>
+          </a:fillRef>
+          <a:effectRef idx="0">
+            <a:schemeClr val="accent1"/>
+          </a:effectRef>
+          <a:fontRef idx="minor">
+            <a:schemeClr val="lt1"/>
+          </a:fontRef>
+        </p:style>
+        <p:txBody>
+          <a:bodyPr rtlCol="0" anchor="ctr"/>
+          <a:lstStyle/>
+          <a:p>
+            <a:pPr algn="ctr"/>
+            <a:endParaRPr lang="en-US"/>
+          </a:p>
+        </p:txBody>
+      </p:sp>
+      <p:sp useBgFill="1">
+        <p:nvSpPr>
+          <p:cNvPr id="64" name="Freeform: Shape 63">
+            <a:extLst>
+              <a:ext uri="{FF2B5EF4-FFF2-40B4-BE49-F238E27FC236}">
+                <a16:creationId xmlns:a16="http://schemas.microsoft.com/office/drawing/2014/main" id="{738B1503-6FE9-46B4-9354-E943D91B11A3}"/>
+              </a:ext>
+              <a:ext uri="{C183D7F6-B498-43B3-948B-1728B52AA6E4}">
+                <adec:decorative xmlns:adec="http://schemas.microsoft.com/office/drawing/2017/decorative" val="1"/>
+              </a:ext>
+            </a:extLst>
+          </p:cNvPr>
+          <p:cNvSpPr>
+            <a:spLocks noGrp="1" noRot="1" noChangeAspect="1" noMove="1" noResize="1" noEditPoints="1" noAdjustHandles="1" noChangeArrowheads="1" noChangeShapeType="1" noTextEdit="1"/>
+          </p:cNvSpPr>
+          <p:nvPr>
+            <p:extLst>
+              <p:ext uri="{386F3935-93C4-4BCD-93E2-E3B085C9AB24}">
+                <p16:designElem xmlns:p16="http://schemas.microsoft.com/office/powerpoint/2015/main" val="1"/>
+              </p:ext>
+            </p:extLst>
+          </p:nvPr>
+        </p:nvSpPr>
+        <p:spPr>
+          <a:xfrm flipH="1">
+            <a:off x="3805514" y="-2"/>
+            <a:ext cx="8386486" cy="6858002"/>
+          </a:xfrm>
+          <a:custGeom>
+            <a:avLst/>
+            <a:gdLst>
+              <a:gd name="connsiteX0" fmla="*/ 0 w 6088489"/>
+              <a:gd name="connsiteY0" fmla="*/ 0 h 6858002"/>
+              <a:gd name="connsiteX1" fmla="*/ 3563332 w 6088489"/>
+              <a:gd name="connsiteY1" fmla="*/ 0 h 6858002"/>
+              <a:gd name="connsiteX2" fmla="*/ 3563332 w 6088489"/>
+              <a:gd name="connsiteY2" fmla="*/ 3 h 6858002"/>
+              <a:gd name="connsiteX3" fmla="*/ 5842099 w 6088489"/>
+              <a:gd name="connsiteY3" fmla="*/ 3 h 6858002"/>
+              <a:gd name="connsiteX4" fmla="*/ 5842099 w 6088489"/>
+              <a:gd name="connsiteY4" fmla="*/ 4 h 6858002"/>
+              <a:gd name="connsiteX5" fmla="*/ 5835346 w 6088489"/>
+              <a:gd name="connsiteY5" fmla="*/ 4 h 6858002"/>
+              <a:gd name="connsiteX6" fmla="*/ 5841229 w 6088489"/>
+              <a:gd name="connsiteY6" fmla="*/ 40466 h 6858002"/>
+              <a:gd name="connsiteX7" fmla="*/ 5858543 w 6088489"/>
+              <a:gd name="connsiteY7" fmla="*/ 159110 h 6858002"/>
+              <a:gd name="connsiteX8" fmla="*/ 5870645 w 6088489"/>
+              <a:gd name="connsiteY8" fmla="*/ 245521 h 6858002"/>
+              <a:gd name="connsiteX9" fmla="*/ 5883420 w 6088489"/>
+              <a:gd name="connsiteY9" fmla="*/ 348391 h 6858002"/>
+              <a:gd name="connsiteX10" fmla="*/ 5898716 w 6088489"/>
+              <a:gd name="connsiteY10" fmla="*/ 470463 h 6858002"/>
+              <a:gd name="connsiteX11" fmla="*/ 5914853 w 6088489"/>
+              <a:gd name="connsiteY11" fmla="*/ 605566 h 6858002"/>
+              <a:gd name="connsiteX12" fmla="*/ 5931830 w 6088489"/>
+              <a:gd name="connsiteY12" fmla="*/ 757813 h 6858002"/>
+              <a:gd name="connsiteX13" fmla="*/ 5949815 w 6088489"/>
+              <a:gd name="connsiteY13" fmla="*/ 923777 h 6858002"/>
+              <a:gd name="connsiteX14" fmla="*/ 5967801 w 6088489"/>
+              <a:gd name="connsiteY14" fmla="*/ 1104142 h 6858002"/>
+              <a:gd name="connsiteX15" fmla="*/ 5986122 w 6088489"/>
+              <a:gd name="connsiteY15" fmla="*/ 1296166 h 6858002"/>
+              <a:gd name="connsiteX16" fmla="*/ 6003099 w 6088489"/>
+              <a:gd name="connsiteY16" fmla="*/ 1503278 h 6858002"/>
+              <a:gd name="connsiteX17" fmla="*/ 6019404 w 6088489"/>
+              <a:gd name="connsiteY17" fmla="*/ 1719991 h 6858002"/>
+              <a:gd name="connsiteX18" fmla="*/ 6034196 w 6088489"/>
+              <a:gd name="connsiteY18" fmla="*/ 1949048 h 6858002"/>
+              <a:gd name="connsiteX19" fmla="*/ 6048315 w 6088489"/>
+              <a:gd name="connsiteY19" fmla="*/ 2187706 h 6858002"/>
+              <a:gd name="connsiteX20" fmla="*/ 6061595 w 6088489"/>
+              <a:gd name="connsiteY20" fmla="*/ 2436652 h 6858002"/>
+              <a:gd name="connsiteX21" fmla="*/ 6066301 w 6088489"/>
+              <a:gd name="connsiteY21" fmla="*/ 2564211 h 6858002"/>
+              <a:gd name="connsiteX22" fmla="*/ 6071512 w 6088489"/>
+              <a:gd name="connsiteY22" fmla="*/ 2694512 h 6858002"/>
+              <a:gd name="connsiteX23" fmla="*/ 6076386 w 6088489"/>
+              <a:gd name="connsiteY23" fmla="*/ 2826871 h 6858002"/>
+              <a:gd name="connsiteX24" fmla="*/ 6079580 w 6088489"/>
+              <a:gd name="connsiteY24" fmla="*/ 2959917 h 6858002"/>
+              <a:gd name="connsiteX25" fmla="*/ 6082438 w 6088489"/>
+              <a:gd name="connsiteY25" fmla="*/ 3095705 h 6858002"/>
+              <a:gd name="connsiteX26" fmla="*/ 6085463 w 6088489"/>
+              <a:gd name="connsiteY26" fmla="*/ 3232865 h 6858002"/>
+              <a:gd name="connsiteX27" fmla="*/ 6087480 w 6088489"/>
+              <a:gd name="connsiteY27" fmla="*/ 3372768 h 6858002"/>
+              <a:gd name="connsiteX28" fmla="*/ 6087480 w 6088489"/>
+              <a:gd name="connsiteY28" fmla="*/ 3514043 h 6858002"/>
+              <a:gd name="connsiteX29" fmla="*/ 6088489 w 6088489"/>
+              <a:gd name="connsiteY29" fmla="*/ 3656689 h 6858002"/>
+              <a:gd name="connsiteX30" fmla="*/ 6087480 w 6088489"/>
+              <a:gd name="connsiteY30" fmla="*/ 3800707 h 6858002"/>
+              <a:gd name="connsiteX31" fmla="*/ 6085463 w 6088489"/>
+              <a:gd name="connsiteY31" fmla="*/ 3946783 h 6858002"/>
+              <a:gd name="connsiteX32" fmla="*/ 6083614 w 6088489"/>
+              <a:gd name="connsiteY32" fmla="*/ 4092858 h 6858002"/>
+              <a:gd name="connsiteX33" fmla="*/ 6079580 w 6088489"/>
+              <a:gd name="connsiteY33" fmla="*/ 4240991 h 6858002"/>
+              <a:gd name="connsiteX34" fmla="*/ 6075378 w 6088489"/>
+              <a:gd name="connsiteY34" fmla="*/ 4390495 h 6858002"/>
+              <a:gd name="connsiteX35" fmla="*/ 6070503 w 6088489"/>
+              <a:gd name="connsiteY35" fmla="*/ 4540000 h 6858002"/>
+              <a:gd name="connsiteX36" fmla="*/ 6063612 w 6088489"/>
+              <a:gd name="connsiteY36" fmla="*/ 4690876 h 6858002"/>
+              <a:gd name="connsiteX37" fmla="*/ 6055375 w 6088489"/>
+              <a:gd name="connsiteY37" fmla="*/ 4843123 h 6858002"/>
+              <a:gd name="connsiteX38" fmla="*/ 6047475 w 6088489"/>
+              <a:gd name="connsiteY38" fmla="*/ 4996057 h 6858002"/>
+              <a:gd name="connsiteX39" fmla="*/ 6037390 w 6088489"/>
+              <a:gd name="connsiteY39" fmla="*/ 5148990 h 6858002"/>
+              <a:gd name="connsiteX40" fmla="*/ 6025287 w 6088489"/>
+              <a:gd name="connsiteY40" fmla="*/ 5303981 h 6858002"/>
+              <a:gd name="connsiteX41" fmla="*/ 6013185 w 6088489"/>
+              <a:gd name="connsiteY41" fmla="*/ 5456914 h 6858002"/>
+              <a:gd name="connsiteX42" fmla="*/ 5999233 w 6088489"/>
+              <a:gd name="connsiteY42" fmla="*/ 5612591 h 6858002"/>
+              <a:gd name="connsiteX43" fmla="*/ 5983937 w 6088489"/>
+              <a:gd name="connsiteY43" fmla="*/ 5768953 h 6858002"/>
+              <a:gd name="connsiteX44" fmla="*/ 5967801 w 6088489"/>
+              <a:gd name="connsiteY44" fmla="*/ 5923258 h 6858002"/>
+              <a:gd name="connsiteX45" fmla="*/ 5948975 w 6088489"/>
+              <a:gd name="connsiteY45" fmla="*/ 6079621 h 6858002"/>
+              <a:gd name="connsiteX46" fmla="*/ 5928804 w 6088489"/>
+              <a:gd name="connsiteY46" fmla="*/ 6235297 h 6858002"/>
+              <a:gd name="connsiteX47" fmla="*/ 5908801 w 6088489"/>
+              <a:gd name="connsiteY47" fmla="*/ 6391660 h 6858002"/>
+              <a:gd name="connsiteX48" fmla="*/ 5885437 w 6088489"/>
+              <a:gd name="connsiteY48" fmla="*/ 6547336 h 6858002"/>
+              <a:gd name="connsiteX49" fmla="*/ 5861568 w 6088489"/>
+              <a:gd name="connsiteY49" fmla="*/ 6702327 h 6858002"/>
+              <a:gd name="connsiteX50" fmla="*/ 5836524 w 6088489"/>
+              <a:gd name="connsiteY50" fmla="*/ 6858002 h 6858002"/>
+              <a:gd name="connsiteX51" fmla="*/ 3563332 w 6088489"/>
+              <a:gd name="connsiteY51" fmla="*/ 6858002 h 6858002"/>
+              <a:gd name="connsiteX52" fmla="*/ 1223490 w 6088489"/>
+              <a:gd name="connsiteY52" fmla="*/ 6858002 h 6858002"/>
+              <a:gd name="connsiteX53" fmla="*/ 0 w 6088489"/>
+              <a:gd name="connsiteY53" fmla="*/ 6858002 h 6858002"/>
+            </a:gdLst>
+            <a:ahLst/>
+            <a:cxnLst>
+              <a:cxn ang="0">
+                <a:pos x="connsiteX0" y="connsiteY0"/>
+              </a:cxn>
+              <a:cxn ang="0">
+                <a:pos x="connsiteX1" y="connsiteY1"/>
+              </a:cxn>
+              <a:cxn ang="0">
+                <a:pos x="connsiteX2" y="connsiteY2"/>
+              </a:cxn>
+              <a:cxn ang="0">
+                <a:pos x="connsiteX3" y="connsiteY3"/>
+              </a:cxn>
+              <a:cxn ang="0">
+                <a:pos x="connsiteX4" y="connsiteY4"/>
+              </a:cxn>
+              <a:cxn ang="0">
+                <a:pos x="connsiteX5" y="connsiteY5"/>
+              </a:cxn>
+              <a:cxn ang="0">
+                <a:pos x="connsiteX6" y="connsiteY6"/>
+              </a:cxn>
+              <a:cxn ang="0">
+                <a:pos x="connsiteX7" y="connsiteY7"/>
+              </a:cxn>
+              <a:cxn ang="0">
+                <a:pos x="connsiteX8" y="connsiteY8"/>
+              </a:cxn>
+              <a:cxn ang="0">
+                <a:pos x="connsiteX9" y="connsiteY9"/>
+              </a:cxn>
+              <a:cxn ang="0">
+                <a:pos x="connsiteX10" y="connsiteY10"/>
+              </a:cxn>
+              <a:cxn ang="0">
+                <a:pos x="connsiteX11" y="connsiteY11"/>
+              </a:cxn>
+              <a:cxn ang="0">
+                <a:pos x="connsiteX12" y="connsiteY12"/>
+              </a:cxn>
+              <a:cxn ang="0">
+                <a:pos x="connsiteX13" y="connsiteY13"/>
+              </a:cxn>
+              <a:cxn ang="0">
+                <a:pos x="connsiteX14" y="connsiteY14"/>
+              </a:cxn>
+              <a:cxn ang="0">
+                <a:pos x="connsiteX15" y="connsiteY15"/>
+              </a:cxn>
+              <a:cxn ang="0">
+                <a:pos x="connsiteX16" y="connsiteY16"/>
+              </a:cxn>
+              <a:cxn ang="0">
+                <a:pos x="connsiteX17" y="connsiteY17"/>
+              </a:cxn>
+              <a:cxn ang="0">
+                <a:pos x="connsiteX18" y="connsiteY18"/>
+              </a:cxn>
+              <a:cxn ang="0">
+                <a:pos x="connsiteX19" y="connsiteY19"/>
+              </a:cxn>
+              <a:cxn ang="0">
+                <a:pos x="connsiteX20" y="connsiteY20"/>
+              </a:cxn>
+              <a:cxn ang="0">
+                <a:pos x="connsiteX21" y="connsiteY21"/>
+              </a:cxn>
+              <a:cxn ang="0">
+                <a:pos x="connsiteX22" y="connsiteY22"/>
+              </a:cxn>
+              <a:cxn ang="0">
+                <a:pos x="connsiteX23" y="connsiteY23"/>
+              </a:cxn>
+              <a:cxn ang="0">
+                <a:pos x="connsiteX24" y="connsiteY24"/>
+              </a:cxn>
+              <a:cxn ang="0">
+                <a:pos x="connsiteX25" y="connsiteY25"/>
+              </a:cxn>
+              <a:cxn ang="0">
+                <a:pos x="connsiteX26" y="connsiteY26"/>
+              </a:cxn>
+              <a:cxn ang="0">
+                <a:pos x="connsiteX27" y="connsiteY27"/>
+              </a:cxn>
+              <a:cxn ang="0">
+                <a:pos x="connsiteX28" y="connsiteY28"/>
+              </a:cxn>
+              <a:cxn ang="0">
+                <a:pos x="connsiteX29" y="connsiteY29"/>
+              </a:cxn>
+              <a:cxn ang="0">
+                <a:pos x="connsiteX30" y="connsiteY30"/>
+              </a:cxn>
+              <a:cxn ang="0">
+                <a:pos x="connsiteX31" y="connsiteY31"/>
+              </a:cxn>
+              <a:cxn ang="0">
+                <a:pos x="connsiteX32" y="connsiteY32"/>
+              </a:cxn>
+              <a:cxn ang="0">
+                <a:pos x="connsiteX33" y="connsiteY33"/>
+              </a:cxn>
+              <a:cxn ang="0">
+                <a:pos x="connsiteX34" y="connsiteY34"/>
+              </a:cxn>
+              <a:cxn ang="0">
+                <a:pos x="connsiteX35" y="connsiteY35"/>
+              </a:cxn>
+              <a:cxn ang="0">
+                <a:pos x="connsiteX36" y="connsiteY36"/>
+              </a:cxn>
+              <a:cxn ang="0">
+                <a:pos x="connsiteX37" y="connsiteY37"/>
+              </a:cxn>
+              <a:cxn ang="0">
+                <a:pos x="connsiteX38" y="connsiteY38"/>
+              </a:cxn>
+              <a:cxn ang="0">
+                <a:pos x="connsiteX39" y="connsiteY39"/>
+              </a:cxn>
+              <a:cxn ang="0">
+                <a:pos x="connsiteX40" y="connsiteY40"/>
+              </a:cxn>
+              <a:cxn ang="0">
+                <a:pos x="connsiteX41" y="connsiteY41"/>
+              </a:cxn>
+              <a:cxn ang="0">
+                <a:pos x="connsiteX42" y="connsiteY42"/>
+              </a:cxn>
+              <a:cxn ang="0">
+                <a:pos x="connsiteX43" y="connsiteY43"/>
+              </a:cxn>
+              <a:cxn ang="0">
+                <a:pos x="connsiteX44" y="connsiteY44"/>
+              </a:cxn>
+              <a:cxn ang="0">
+                <a:pos x="connsiteX45" y="connsiteY45"/>
+              </a:cxn>
+              <a:cxn ang="0">
+                <a:pos x="connsiteX46" y="connsiteY46"/>
+              </a:cxn>
+              <a:cxn ang="0">
+                <a:pos x="connsiteX47" y="connsiteY47"/>
+              </a:cxn>
+              <a:cxn ang="0">
+                <a:pos x="connsiteX48" y="connsiteY48"/>
+              </a:cxn>
+              <a:cxn ang="0">
+                <a:pos x="connsiteX49" y="connsiteY49"/>
+              </a:cxn>
+              <a:cxn ang="0">
+                <a:pos x="connsiteX50" y="connsiteY50"/>
+              </a:cxn>
+              <a:cxn ang="0">
+                <a:pos x="connsiteX51" y="connsiteY51"/>
+              </a:cxn>
+              <a:cxn ang="0">
+                <a:pos x="connsiteX52" y="connsiteY52"/>
+              </a:cxn>
+              <a:cxn ang="0">
+                <a:pos x="connsiteX53" y="connsiteY53"/>
+              </a:cxn>
+            </a:cxnLst>
+            <a:rect l="l" t="t" r="r" b="b"/>
+            <a:pathLst>
+              <a:path w="6088489" h="6858002">
+                <a:moveTo>
+                  <a:pt x="0" y="0"/>
+                </a:moveTo>
+                <a:lnTo>
+                  <a:pt x="3563332" y="0"/>
+                </a:lnTo>
+                <a:lnTo>
+                  <a:pt x="3563332" y="3"/>
+                </a:lnTo>
+                <a:lnTo>
+                  <a:pt x="5842099" y="3"/>
+                </a:lnTo>
+                <a:lnTo>
+                  <a:pt x="5842099" y="4"/>
+                </a:lnTo>
+                <a:lnTo>
+                  <a:pt x="5835346" y="4"/>
+                </a:lnTo>
+                <a:lnTo>
+                  <a:pt x="5841229" y="40466"/>
+                </a:lnTo>
+                <a:lnTo>
+                  <a:pt x="5858543" y="159110"/>
+                </a:lnTo>
+                <a:lnTo>
+                  <a:pt x="5870645" y="245521"/>
+                </a:lnTo>
+                <a:lnTo>
+                  <a:pt x="5883420" y="348391"/>
+                </a:lnTo>
+                <a:lnTo>
+                  <a:pt x="5898716" y="470463"/>
+                </a:lnTo>
+                <a:lnTo>
+                  <a:pt x="5914853" y="605566"/>
+                </a:lnTo>
+                <a:lnTo>
+                  <a:pt x="5931830" y="757813"/>
+                </a:lnTo>
+                <a:lnTo>
+                  <a:pt x="5949815" y="923777"/>
+                </a:lnTo>
+                <a:lnTo>
+                  <a:pt x="5967801" y="1104142"/>
+                </a:lnTo>
+                <a:lnTo>
+                  <a:pt x="5986122" y="1296166"/>
+                </a:lnTo>
+                <a:lnTo>
+                  <a:pt x="6003099" y="1503278"/>
+                </a:lnTo>
+                <a:lnTo>
+                  <a:pt x="6019404" y="1719991"/>
+                </a:lnTo>
+                <a:lnTo>
+                  <a:pt x="6034196" y="1949048"/>
+                </a:lnTo>
+                <a:lnTo>
+                  <a:pt x="6048315" y="2187706"/>
+                </a:lnTo>
+                <a:lnTo>
+                  <a:pt x="6061595" y="2436652"/>
+                </a:lnTo>
+                <a:lnTo>
+                  <a:pt x="6066301" y="2564211"/>
+                </a:lnTo>
+                <a:lnTo>
+                  <a:pt x="6071512" y="2694512"/>
+                </a:lnTo>
+                <a:lnTo>
+                  <a:pt x="6076386" y="2826871"/>
+                </a:lnTo>
+                <a:lnTo>
+                  <a:pt x="6079580" y="2959917"/>
+                </a:lnTo>
+                <a:lnTo>
+                  <a:pt x="6082438" y="3095705"/>
+                </a:lnTo>
+                <a:lnTo>
+                  <a:pt x="6085463" y="3232865"/>
+                </a:lnTo>
+                <a:lnTo>
+                  <a:pt x="6087480" y="3372768"/>
+                </a:lnTo>
+                <a:lnTo>
+                  <a:pt x="6087480" y="3514043"/>
+                </a:lnTo>
+                <a:lnTo>
+                  <a:pt x="6088489" y="3656689"/>
+                </a:lnTo>
+                <a:lnTo>
+                  <a:pt x="6087480" y="3800707"/>
+                </a:lnTo>
+                <a:lnTo>
+                  <a:pt x="6085463" y="3946783"/>
+                </a:lnTo>
+                <a:lnTo>
+                  <a:pt x="6083614" y="4092858"/>
+                </a:lnTo>
+                <a:lnTo>
+                  <a:pt x="6079580" y="4240991"/>
+                </a:lnTo>
+                <a:lnTo>
+                  <a:pt x="6075378" y="4390495"/>
+                </a:lnTo>
+                <a:lnTo>
+                  <a:pt x="6070503" y="4540000"/>
+                </a:lnTo>
+                <a:lnTo>
+                  <a:pt x="6063612" y="4690876"/>
+                </a:lnTo>
+                <a:lnTo>
+                  <a:pt x="6055375" y="4843123"/>
+                </a:lnTo>
+                <a:lnTo>
+                  <a:pt x="6047475" y="4996057"/>
+                </a:lnTo>
+                <a:lnTo>
+                  <a:pt x="6037390" y="5148990"/>
+                </a:lnTo>
+                <a:lnTo>
+                  <a:pt x="6025287" y="5303981"/>
+                </a:lnTo>
+                <a:lnTo>
+                  <a:pt x="6013185" y="5456914"/>
+                </a:lnTo>
+                <a:lnTo>
+                  <a:pt x="5999233" y="5612591"/>
+                </a:lnTo>
+                <a:lnTo>
+                  <a:pt x="5983937" y="5768953"/>
+                </a:lnTo>
+                <a:lnTo>
+                  <a:pt x="5967801" y="5923258"/>
+                </a:lnTo>
+                <a:lnTo>
+                  <a:pt x="5948975" y="6079621"/>
+                </a:lnTo>
+                <a:lnTo>
+                  <a:pt x="5928804" y="6235297"/>
+                </a:lnTo>
+                <a:lnTo>
+                  <a:pt x="5908801" y="6391660"/>
+                </a:lnTo>
+                <a:lnTo>
+                  <a:pt x="5885437" y="6547336"/>
+                </a:lnTo>
+                <a:lnTo>
+                  <a:pt x="5861568" y="6702327"/>
+                </a:lnTo>
+                <a:lnTo>
+                  <a:pt x="5836524" y="6858002"/>
+                </a:lnTo>
+                <a:lnTo>
+                  <a:pt x="3563332" y="6858002"/>
+                </a:lnTo>
+                <a:lnTo>
+                  <a:pt x="1223490" y="6858002"/>
+                </a:lnTo>
+                <a:lnTo>
+                  <a:pt x="0" y="6858002"/>
+                </a:lnTo>
+                <a:close/>
+              </a:path>
+            </a:pathLst>
+          </a:custGeom>
+          <a:ln>
+            <a:noFill/>
+          </a:ln>
+          <a:effectLst>
+            <a:outerShdw blurRad="50800" dist="38100" dir="10800000" algn="r" rotWithShape="0">
+              <a:prstClr val="black">
+                <a:alpha val="40000"/>
+              </a:prstClr>
+            </a:outerShdw>
+          </a:effectLst>
+        </p:spPr>
+        <p:style>
+          <a:lnRef idx="2">
+            <a:schemeClr val="accent1">
+              <a:shade val="50000"/>
+            </a:schemeClr>
+          </a:lnRef>
+          <a:fillRef idx="1">
+            <a:schemeClr val="accent1"/>
+          </a:fillRef>
+          <a:effectRef idx="0">
+            <a:schemeClr val="accent1"/>
+          </a:effectRef>
+          <a:fontRef idx="minor">
+            <a:schemeClr val="lt1"/>
+          </a:fontRef>
+        </p:style>
+        <p:txBody>
+          <a:bodyPr rtlCol="0" anchor="ctr"/>
+          <a:lstStyle/>
+          <a:p>
+            <a:pPr algn="ctr"/>
+            <a:endParaRPr lang="en-US"/>
+          </a:p>
+        </p:txBody>
+      </p:sp>
+      <p:sp>
+        <p:nvSpPr>
+          <p:cNvPr id="2" name="Title 1">
+            <a:extLst>
+              <a:ext uri="{FF2B5EF4-FFF2-40B4-BE49-F238E27FC236}">
+                <a16:creationId xmlns:a16="http://schemas.microsoft.com/office/drawing/2014/main" id="{89559F60-4CE1-4E2F-86EA-1B60679F1F4A}"/>
+              </a:ext>
+            </a:extLst>
+          </p:cNvPr>
+          <p:cNvSpPr>
+            <a:spLocks noGrp="1"/>
+          </p:cNvSpPr>
+          <p:nvPr>
+            <p:ph type="title"/>
+          </p:nvPr>
+        </p:nvSpPr>
+        <p:spPr>
+          <a:xfrm>
+            <a:off x="4654295" y="965196"/>
+            <a:ext cx="6197686" cy="1371604"/>
+          </a:xfrm>
+        </p:spPr>
+        <p:txBody>
+          <a:bodyPr>
+            <a:normAutofit/>
+          </a:bodyPr>
+          <a:lstStyle/>
+          <a:p>
+            <a:pPr algn="l"/>
+            <a:r>
+              <a:rPr lang="en-US"/>
+              <a:t>Purpose	</a:t>
+            </a:r>
+          </a:p>
+        </p:txBody>
+      </p:sp>
+      <p:pic>
+        <p:nvPicPr>
+          <p:cNvPr id="3" name="Picture 2">
+            <a:extLst>
+              <a:ext uri="{FF2B5EF4-FFF2-40B4-BE49-F238E27FC236}">
+                <a16:creationId xmlns:a16="http://schemas.microsoft.com/office/drawing/2014/main" id="{72B2D6DE-C9B5-4678-91EF-77E85F2350DA}"/>
+              </a:ext>
+              <a:ext uri="{C183D7F6-B498-43B3-948B-1728B52AA6E4}">
+                <adec:decorative xmlns:adec="http://schemas.microsoft.com/office/drawing/2017/decorative" val="1"/>
+              </a:ext>
+            </a:extLst>
+          </p:cNvPr>
+          <p:cNvPicPr>
+            <a:picLocks noChangeAspect="1"/>
+          </p:cNvPicPr>
+          <p:nvPr/>
+        </p:nvPicPr>
+        <p:blipFill rotWithShape="1">
+          <a:blip r:embed="rId5">
+            <a:extLst>
+              <a:ext uri="{28A0092B-C50C-407E-A947-70E740481C1C}">
+                <a14:useLocalDpi xmlns:a14="http://schemas.microsoft.com/office/drawing/2010/main" val="0"/>
+              </a:ext>
+            </a:extLst>
+          </a:blip>
+          <a:srcRect b="-1"/>
+          <a:stretch/>
+        </p:blipFill>
+        <p:spPr>
+          <a:xfrm>
+            <a:off x="644332" y="2014540"/>
+            <a:ext cx="2517715" cy="2828921"/>
+          </a:xfrm>
+          <a:prstGeom prst="rect">
+            <a:avLst/>
+          </a:prstGeom>
+        </p:spPr>
+      </p:pic>
+      <p:sp>
+        <p:nvSpPr>
+          <p:cNvPr id="24" name="Content Placeholder 2">
+            <a:extLst>
+              <a:ext uri="{FF2B5EF4-FFF2-40B4-BE49-F238E27FC236}">
+                <a16:creationId xmlns:a16="http://schemas.microsoft.com/office/drawing/2014/main" id="{F260476B-CCA6-412B-A9C5-399C34AE6F05}"/>
+              </a:ext>
+            </a:extLst>
+          </p:cNvPr>
+          <p:cNvSpPr>
+            <a:spLocks noGrp="1"/>
+          </p:cNvSpPr>
+          <p:nvPr>
+            <p:ph idx="1"/>
+          </p:nvPr>
+        </p:nvSpPr>
+        <p:spPr>
+          <a:xfrm>
+            <a:off x="4654295" y="2617694"/>
+            <a:ext cx="6197686" cy="3173505"/>
+          </a:xfrm>
+        </p:spPr>
+        <p:txBody>
+          <a:bodyPr>
+            <a:normAutofit/>
+          </a:bodyPr>
+          <a:lstStyle/>
+          <a:p>
+            <a:pPr marL="36900" lvl="0" indent="0">
+              <a:buNone/>
+            </a:pPr>
+            <a:r>
+              <a:rPr lang="en-US"/>
+              <a:t>To allow users to visualize data of our avocado sales.</a:t>
+            </a:r>
+          </a:p>
+        </p:txBody>
+      </p:sp>
+    </p:spTree>
+    <p:extLst>
+      <p:ext uri="{BB962C8B-B14F-4D97-AF65-F5344CB8AC3E}">
+        <p14:creationId xmlns:p14="http://schemas.microsoft.com/office/powerpoint/2010/main" val="3220235682"/>
+      </p:ext>
+    </p:extLst>
+  </p:cSld>
+  <p:clrMapOvr>
+    <a:masterClrMapping/>
+  </p:clrMapOvr>
+</p:sld>
+</file>
+
+<file path=ppt/slides/slide3.xml><?xml version="1.0" encoding="utf-8"?>
 <p:sld xmlns:a="http://schemas.openxmlformats.org/drawingml/2006/main" xmlns:r="http://schemas.openxmlformats.org/officeDocument/2006/relationships" xmlns:p="http://schemas.openxmlformats.org/presentationml/2006/main">
   <p:cSld>
     <p:bg>
@@ -7521,8 +8403,8 @@
         </p:blipFill>
         <p:spPr>
           <a:xfrm>
-            <a:off x="256759" y="209939"/>
-            <a:ext cx="5565238" cy="3429000"/>
+            <a:off x="158368" y="318996"/>
+            <a:ext cx="5854215" cy="3607052"/>
           </a:xfrm>
           <a:prstGeom prst="rect">
             <a:avLst/>
@@ -7542,7 +8424,7 @@
 </p:sld>
 </file>
 
-<file path=ppt/slides/slide3.xml><?xml version="1.0" encoding="utf-8"?>
+<file path=ppt/slides/slide4.xml><?xml version="1.0" encoding="utf-8"?>
 <p:sld xmlns:a="http://schemas.openxmlformats.org/drawingml/2006/main" xmlns:r="http://schemas.openxmlformats.org/officeDocument/2006/relationships" xmlns:p="http://schemas.openxmlformats.org/presentationml/2006/main">
   <p:cSld>
     <p:bg>
@@ -7780,7 +8662,7 @@
             <a:pPr algn="l"/>
             <a:r>
               <a:rPr lang="en-US" sz="4000" dirty="0"/>
-              <a:t>Purpose	</a:t>
+              <a:t>What I built	</a:t>
             </a:r>
           </a:p>
         </p:txBody>
@@ -7809,7 +8691,7 @@
         </p:spPr>
         <p:txBody>
           <a:bodyPr anchor="t">
-            <a:normAutofit/>
+            <a:normAutofit lnSpcReduction="10000"/>
           </a:bodyPr>
           <a:lstStyle/>
           <a:p>
@@ -7818,18 +8700,66 @@
             </a:pPr>
             <a:r>
               <a:rPr lang="en-US" sz="2400" dirty="0"/>
-              <a:t>To allow users to visualize data of our avocado sales and interact with it as they see fit.</a:t>
+              <a:t>I built an interactive dashboard allowing users to view maps and graphs based on data from the avocado board.</a:t>
             </a:r>
           </a:p>
           <a:p>
+            <a:pPr marL="36900" lvl="0" indent="0">
+              <a:buNone/>
+            </a:pPr>
+            <a:r>
+              <a:rPr lang="en-US" sz="2400" dirty="0"/>
+              <a:t>Slicers and cards make it easy to filter data and see data points based on those filters.</a:t>
+            </a:r>
+          </a:p>
+          <a:p>
+            <a:pPr marL="36900" lvl="0" indent="0">
+              <a:buNone/>
+            </a:pPr>
+            <a:r>
+              <a:rPr lang="en-US" sz="2400" dirty="0"/>
+              <a:t>Users can ask questions in the dashboard.</a:t>
+            </a:r>
+          </a:p>
+          <a:p>
             <a:endParaRPr lang="en-US" sz="2400" dirty="0"/>
           </a:p>
         </p:txBody>
       </p:sp>
+      <p:pic>
+        <p:nvPicPr>
+          <p:cNvPr id="5" name="Picture 4">
+            <a:extLst>
+              <a:ext uri="{FF2B5EF4-FFF2-40B4-BE49-F238E27FC236}">
+                <a16:creationId xmlns:a16="http://schemas.microsoft.com/office/drawing/2014/main" id="{07C182A4-ED8D-40AE-8389-FA826642D6D4}"/>
+              </a:ext>
+            </a:extLst>
+          </p:cNvPr>
+          <p:cNvPicPr>
+            <a:picLocks noChangeAspect="1"/>
+          </p:cNvPicPr>
+          <p:nvPr/>
+        </p:nvPicPr>
+        <p:blipFill>
+          <a:blip r:embed="rId7"/>
+          <a:stretch>
+            <a:fillRect/>
+          </a:stretch>
+        </p:blipFill>
+        <p:spPr>
+          <a:xfrm>
+            <a:off x="196814" y="1338263"/>
+            <a:ext cx="5685127" cy="2090737"/>
+          </a:xfrm>
+          <a:prstGeom prst="rect">
+            <a:avLst/>
+          </a:prstGeom>
+        </p:spPr>
+      </p:pic>
     </p:spTree>
     <p:extLst>
       <p:ext uri="{BB962C8B-B14F-4D97-AF65-F5344CB8AC3E}">
-        <p14:creationId xmlns:p14="http://schemas.microsoft.com/office/powerpoint/2010/main" val="3220235682"/>
+        <p14:creationId xmlns:p14="http://schemas.microsoft.com/office/powerpoint/2010/main" val="3482824961"/>
       </p:ext>
     </p:extLst>
   </p:cSld>
@@ -7839,7 +8769,361 @@
 </p:sld>
 </file>
 
-<file path=ppt/slides/slide4.xml><?xml version="1.0" encoding="utf-8"?>
+<file path=ppt/slides/slide5.xml><?xml version="1.0" encoding="utf-8"?>
+<p:sld xmlns:a="http://schemas.openxmlformats.org/drawingml/2006/main" xmlns:r="http://schemas.openxmlformats.org/officeDocument/2006/relationships" xmlns:p="http://schemas.openxmlformats.org/presentationml/2006/main">
+  <p:cSld>
+    <p:bg>
+      <p:bgPr>
+        <a:blipFill rotWithShape="1">
+          <a:blip r:embed="rId4">
+            <a:duotone>
+              <a:schemeClr val="bg1">
+                <a:shade val="80000"/>
+                <a:lumMod val="80000"/>
+              </a:schemeClr>
+              <a:schemeClr val="bg1">
+                <a:tint val="98000"/>
+              </a:schemeClr>
+            </a:duotone>
+          </a:blip>
+          <a:stretch/>
+        </a:blipFill>
+        <a:effectLst/>
+      </p:bgPr>
+    </p:bg>
+    <p:spTree>
+      <p:nvGrpSpPr>
+        <p:cNvPr id="1" name=""/>
+        <p:cNvGrpSpPr/>
+        <p:nvPr/>
+      </p:nvGrpSpPr>
+      <p:grpSpPr>
+        <a:xfrm>
+          <a:off x="0" y="0"/>
+          <a:ext cx="0" cy="0"/>
+          <a:chOff x="0" y="0"/>
+          <a:chExt cx="0" cy="0"/>
+        </a:xfrm>
+      </p:grpSpPr>
+      <p:sp useBgFill="1">
+        <p:nvSpPr>
+          <p:cNvPr id="55" name="Rectangle 54">
+            <a:extLst>
+              <a:ext uri="{FF2B5EF4-FFF2-40B4-BE49-F238E27FC236}">
+                <a16:creationId xmlns:a16="http://schemas.microsoft.com/office/drawing/2014/main" id="{0EF2A0DA-AE81-4A45-972E-646AC2870C2F}"/>
+              </a:ext>
+              <a:ext uri="{C183D7F6-B498-43B3-948B-1728B52AA6E4}">
+                <adec:decorative xmlns:adec="http://schemas.microsoft.com/office/drawing/2017/decorative" val="1"/>
+              </a:ext>
+            </a:extLst>
+          </p:cNvPr>
+          <p:cNvSpPr>
+            <a:spLocks noGrp="1" noRot="1" noChangeAspect="1" noMove="1" noResize="1" noEditPoints="1" noAdjustHandles="1" noChangeArrowheads="1" noChangeShapeType="1" noTextEdit="1"/>
+          </p:cNvSpPr>
+          <p:nvPr>
+            <p:extLst>
+              <p:ext uri="{386F3935-93C4-4BCD-93E2-E3B085C9AB24}">
+                <p16:designElem xmlns:p16="http://schemas.microsoft.com/office/powerpoint/2015/main" val="1"/>
+              </p:ext>
+            </p:extLst>
+          </p:nvPr>
+        </p:nvSpPr>
+        <p:spPr>
+          <a:xfrm>
+            <a:off x="0" y="0"/>
+            <a:ext cx="12192000" cy="6858000"/>
+          </a:xfrm>
+          <a:prstGeom prst="rect">
+            <a:avLst/>
+          </a:prstGeom>
+          <a:ln>
+            <a:noFill/>
+          </a:ln>
+        </p:spPr>
+        <p:style>
+          <a:lnRef idx="2">
+            <a:schemeClr val="accent1">
+              <a:shade val="50000"/>
+            </a:schemeClr>
+          </a:lnRef>
+          <a:fillRef idx="1">
+            <a:schemeClr val="accent1"/>
+          </a:fillRef>
+          <a:effectRef idx="0">
+            <a:schemeClr val="accent1"/>
+          </a:effectRef>
+          <a:fontRef idx="minor">
+            <a:schemeClr val="lt1"/>
+          </a:fontRef>
+        </p:style>
+        <p:txBody>
+          <a:bodyPr rtlCol="0" anchor="ctr"/>
+          <a:lstStyle/>
+          <a:p>
+            <a:pPr marL="0" marR="0" lvl="0" indent="0" algn="ctr" defTabSz="914400" rtl="0" eaLnBrk="1" fontAlgn="auto" latinLnBrk="0" hangingPunct="1">
+              <a:lnSpc>
+                <a:spcPct val="100000"/>
+              </a:lnSpc>
+              <a:spcBef>
+                <a:spcPts val="0"/>
+              </a:spcBef>
+              <a:spcAft>
+                <a:spcPts val="0"/>
+              </a:spcAft>
+              <a:buClrTx/>
+              <a:buSzTx/>
+              <a:buFontTx/>
+              <a:buNone/>
+              <a:tabLst/>
+              <a:defRPr/>
+            </a:pPr>
+            <a:endParaRPr kumimoji="0" lang="en-US" sz="1800" b="0" i="0" u="none" strike="noStrike" kern="1200" cap="none" spc="0" normalizeH="0" baseline="0" noProof="0" dirty="0">
+              <a:ln>
+                <a:noFill/>
+              </a:ln>
+              <a:solidFill>
+                <a:prstClr val="white"/>
+              </a:solidFill>
+              <a:effectLst/>
+              <a:uLnTx/>
+              <a:uFillTx/>
+              <a:latin typeface="Goudy Old Style"/>
+              <a:ea typeface="+mn-ea"/>
+              <a:cs typeface="+mn-cs"/>
+            </a:endParaRPr>
+          </a:p>
+        </p:txBody>
+      </p:sp>
+      <p:pic>
+        <p:nvPicPr>
+          <p:cNvPr id="3" name="Picture 2">
+            <a:extLst>
+              <a:ext uri="{FF2B5EF4-FFF2-40B4-BE49-F238E27FC236}">
+                <a16:creationId xmlns:a16="http://schemas.microsoft.com/office/drawing/2014/main" id="{72B2D6DE-C9B5-4678-91EF-77E85F2350DA}"/>
+              </a:ext>
+              <a:ext uri="{C183D7F6-B498-43B3-948B-1728B52AA6E4}">
+                <adec:decorative xmlns:adec="http://schemas.microsoft.com/office/drawing/2017/decorative" val="1"/>
+              </a:ext>
+            </a:extLst>
+          </p:cNvPr>
+          <p:cNvPicPr>
+            <a:picLocks noChangeAspect="1"/>
+          </p:cNvPicPr>
+          <p:nvPr/>
+        </p:nvPicPr>
+        <p:blipFill rotWithShape="1">
+          <a:blip r:embed="rId5">
+            <a:extLst>
+              <a:ext uri="{28A0092B-C50C-407E-A947-70E740481C1C}">
+                <a14:useLocalDpi xmlns:a14="http://schemas.microsoft.com/office/drawing/2010/main" val="0"/>
+              </a:ext>
+            </a:extLst>
+          </a:blip>
+          <a:srcRect b="-1"/>
+          <a:stretch/>
+        </p:blipFill>
+        <p:spPr>
+          <a:xfrm>
+            <a:off x="0" y="11"/>
+            <a:ext cx="6095999" cy="6857989"/>
+          </a:xfrm>
+          <a:prstGeom prst="rect">
+            <a:avLst/>
+          </a:prstGeom>
+        </p:spPr>
+      </p:pic>
+      <p:pic>
+        <p:nvPicPr>
+          <p:cNvPr id="57" name="Picture 56">
+            <a:extLst>
+              <a:ext uri="{FF2B5EF4-FFF2-40B4-BE49-F238E27FC236}">
+                <a16:creationId xmlns:a16="http://schemas.microsoft.com/office/drawing/2014/main" id="{B536FA4E-0152-4E27-91DA-0FC22D1846BB}"/>
+              </a:ext>
+              <a:ext uri="{C183D7F6-B498-43B3-948B-1728B52AA6E4}">
+                <adec:decorative xmlns:adec="http://schemas.microsoft.com/office/drawing/2017/decorative" val="1"/>
+              </a:ext>
+            </a:extLst>
+          </p:cNvPr>
+          <p:cNvPicPr>
+            <a:picLocks noGrp="1" noRot="1" noChangeAspect="1" noMove="1" noResize="1" noEditPoints="1" noAdjustHandles="1" noChangeArrowheads="1" noChangeShapeType="1" noCrop="1"/>
+          </p:cNvPicPr>
+          <p:nvPr>
+            <p:extLst>
+              <p:ext uri="{386F3935-93C4-4BCD-93E2-E3B085C9AB24}">
+                <p16:designElem xmlns:p16="http://schemas.microsoft.com/office/powerpoint/2015/main" val="1"/>
+              </p:ext>
+            </p:extLst>
+          </p:nvPr>
+        </p:nvPicPr>
+        <p:blipFill rotWithShape="1">
+          <a:blip r:embed="rId6">
+            <a:extLst>
+              <a:ext uri="{28A0092B-C50C-407E-A947-70E740481C1C}">
+                <a14:useLocalDpi xmlns:a14="http://schemas.microsoft.com/office/drawing/2010/main" val="0"/>
+              </a:ext>
+            </a:extLst>
+          </a:blip>
+          <a:srcRect/>
+          <a:stretch/>
+        </p:blipFill>
+        <p:spPr>
+          <a:xfrm>
+            <a:off x="6257026" y="1"/>
+            <a:ext cx="5934973" cy="6858000"/>
+          </a:xfrm>
+          <a:prstGeom prst="rect">
+            <a:avLst/>
+          </a:prstGeom>
+        </p:spPr>
+      </p:pic>
+      <p:sp>
+        <p:nvSpPr>
+          <p:cNvPr id="2" name="Title 1">
+            <a:extLst>
+              <a:ext uri="{FF2B5EF4-FFF2-40B4-BE49-F238E27FC236}">
+                <a16:creationId xmlns:a16="http://schemas.microsoft.com/office/drawing/2014/main" id="{89559F60-4CE1-4E2F-86EA-1B60679F1F4A}"/>
+              </a:ext>
+            </a:extLst>
+          </p:cNvPr>
+          <p:cNvSpPr>
+            <a:spLocks noGrp="1"/>
+          </p:cNvSpPr>
+          <p:nvPr>
+            <p:ph type="title"/>
+          </p:nvPr>
+        </p:nvSpPr>
+        <p:spPr>
+          <a:xfrm>
+            <a:off x="6900493" y="609600"/>
+            <a:ext cx="4538124" cy="970450"/>
+          </a:xfrm>
+        </p:spPr>
+        <p:txBody>
+          <a:bodyPr anchor="b">
+            <a:normAutofit fontScale="90000"/>
+          </a:bodyPr>
+          <a:lstStyle/>
+          <a:p>
+            <a:pPr algn="l"/>
+            <a:r>
+              <a:rPr lang="en-US" sz="4000" dirty="0"/>
+              <a:t>Larger Geo area groups	</a:t>
+            </a:r>
+          </a:p>
+        </p:txBody>
+      </p:sp>
+      <p:sp>
+        <p:nvSpPr>
+          <p:cNvPr id="24" name="Content Placeholder 2">
+            <a:extLst>
+              <a:ext uri="{FF2B5EF4-FFF2-40B4-BE49-F238E27FC236}">
+                <a16:creationId xmlns:a16="http://schemas.microsoft.com/office/drawing/2014/main" id="{F260476B-CCA6-412B-A9C5-399C34AE6F05}"/>
+              </a:ext>
+            </a:extLst>
+          </p:cNvPr>
+          <p:cNvSpPr>
+            <a:spLocks noGrp="1"/>
+          </p:cNvSpPr>
+          <p:nvPr>
+            <p:ph idx="1"/>
+          </p:nvPr>
+        </p:nvSpPr>
+        <p:spPr>
+          <a:xfrm>
+            <a:off x="6900493" y="1732449"/>
+            <a:ext cx="4403596" cy="4058751"/>
+          </a:xfrm>
+        </p:spPr>
+        <p:txBody>
+          <a:bodyPr anchor="t">
+            <a:normAutofit/>
+          </a:bodyPr>
+          <a:lstStyle/>
+          <a:p>
+            <a:pPr marL="36900" lvl="0" indent="0">
+              <a:buNone/>
+            </a:pPr>
+            <a:r>
+              <a:rPr lang="en-US" sz="2400" dirty="0"/>
+              <a:t>These area groups are what I used based on the website's regional division, which had 8 regions.</a:t>
+            </a:r>
+          </a:p>
+        </p:txBody>
+      </p:sp>
+      <p:pic>
+        <p:nvPicPr>
+          <p:cNvPr id="4" name="Picture 3">
+            <a:extLst>
+              <a:ext uri="{FF2B5EF4-FFF2-40B4-BE49-F238E27FC236}">
+                <a16:creationId xmlns:a16="http://schemas.microsoft.com/office/drawing/2014/main" id="{58D4697B-C867-44CC-9958-1A8B927FB6B9}"/>
+              </a:ext>
+            </a:extLst>
+          </p:cNvPr>
+          <p:cNvPicPr>
+            <a:picLocks noChangeAspect="1"/>
+          </p:cNvPicPr>
+          <p:nvPr/>
+        </p:nvPicPr>
+        <p:blipFill>
+          <a:blip r:embed="rId7"/>
+          <a:stretch>
+            <a:fillRect/>
+          </a:stretch>
+        </p:blipFill>
+        <p:spPr>
+          <a:xfrm>
+            <a:off x="1138335" y="0"/>
+            <a:ext cx="4431012" cy="3347428"/>
+          </a:xfrm>
+          <a:prstGeom prst="rect">
+            <a:avLst/>
+          </a:prstGeom>
+        </p:spPr>
+      </p:pic>
+      <p:pic>
+        <p:nvPicPr>
+          <p:cNvPr id="5" name="Picture 4">
+            <a:extLst>
+              <a:ext uri="{FF2B5EF4-FFF2-40B4-BE49-F238E27FC236}">
+                <a16:creationId xmlns:a16="http://schemas.microsoft.com/office/drawing/2014/main" id="{1139443C-8AD4-4B53-B7A9-15F2D51EE62C}"/>
+              </a:ext>
+            </a:extLst>
+          </p:cNvPr>
+          <p:cNvPicPr>
+            <a:picLocks noChangeAspect="1"/>
+          </p:cNvPicPr>
+          <p:nvPr/>
+        </p:nvPicPr>
+        <p:blipFill>
+          <a:blip r:embed="rId8"/>
+          <a:stretch>
+            <a:fillRect/>
+          </a:stretch>
+        </p:blipFill>
+        <p:spPr>
+          <a:xfrm>
+            <a:off x="810666" y="3429000"/>
+            <a:ext cx="5086350" cy="3228975"/>
+          </a:xfrm>
+          <a:prstGeom prst="rect">
+            <a:avLst/>
+          </a:prstGeom>
+        </p:spPr>
+      </p:pic>
+    </p:spTree>
+    <p:extLst>
+      <p:ext uri="{BB962C8B-B14F-4D97-AF65-F5344CB8AC3E}">
+        <p14:creationId xmlns:p14="http://schemas.microsoft.com/office/powerpoint/2010/main" val="3937201407"/>
+      </p:ext>
+    </p:extLst>
+  </p:cSld>
+  <p:clrMapOvr>
+    <a:masterClrMapping/>
+  </p:clrMapOvr>
+</p:sld>
+</file>
+
+<file path=ppt/slides/slide6.xml><?xml version="1.0" encoding="utf-8"?>
 <p:sld xmlns:a="http://schemas.openxmlformats.org/drawingml/2006/main" xmlns:r="http://schemas.openxmlformats.org/officeDocument/2006/relationships" xmlns:p="http://schemas.openxmlformats.org/presentationml/2006/main">
   <p:cSld>
     <p:bg>
@@ -8095,7 +9379,7 @@
           </a:effectLst>
           <a:extLst>
             <a:ext uri="{91240B29-F687-4f45-9708-019B960494DF}">
-              <a14:hiddenLine xmlns="" xmlns:a14="http://schemas.microsoft.com/office/drawing/2010/main" xmlns:p14="http://schemas.microsoft.com/office/powerpoint/2010/main" xmlns:a16="http://schemas.microsoft.com/office/drawing/2014/main" w="9525">
+              <a14:hiddenLine xmlns:a16="http://schemas.microsoft.com/office/drawing/2014/main" xmlns:p14="http://schemas.microsoft.com/office/powerpoint/2010/main" xmlns:a14="http://schemas.microsoft.com/office/drawing/2010/main" xmlns="" w="9525">
                 <a:solidFill>
                   <a:srgbClr val="000000"/>
                 </a:solidFill>
@@ -8299,7 +9583,7 @@
 </p:sld>
 </file>
 
-<file path=ppt/slides/slide5.xml><?xml version="1.0" encoding="utf-8"?>
+<file path=ppt/slides/slide7.xml><?xml version="1.0" encoding="utf-8"?>
 <p:sld xmlns:a="http://schemas.openxmlformats.org/drawingml/2006/main" xmlns:r="http://schemas.openxmlformats.org/officeDocument/2006/relationships" xmlns:p="http://schemas.openxmlformats.org/presentationml/2006/main">
   <p:cSld>
     <p:bg>
@@ -8587,360 +9871,6 @@
     <p:extLst>
       <p:ext uri="{BB962C8B-B14F-4D97-AF65-F5344CB8AC3E}">
         <p14:creationId xmlns:p14="http://schemas.microsoft.com/office/powerpoint/2010/main" val="2529689668"/>
-      </p:ext>
-    </p:extLst>
-  </p:cSld>
-  <p:clrMapOvr>
-    <a:masterClrMapping/>
-  </p:clrMapOvr>
-</p:sld>
-</file>
-
-<file path=ppt/slides/slide6.xml><?xml version="1.0" encoding="utf-8"?>
-<p:sld xmlns:a="http://schemas.openxmlformats.org/drawingml/2006/main" xmlns:r="http://schemas.openxmlformats.org/officeDocument/2006/relationships" xmlns:p="http://schemas.openxmlformats.org/presentationml/2006/main">
-  <p:cSld>
-    <p:bg>
-      <p:bgPr>
-        <a:blipFill rotWithShape="1">
-          <a:blip r:embed="rId4">
-            <a:duotone>
-              <a:schemeClr val="bg1">
-                <a:shade val="80000"/>
-                <a:lumMod val="80000"/>
-              </a:schemeClr>
-              <a:schemeClr val="bg1">
-                <a:tint val="98000"/>
-              </a:schemeClr>
-            </a:duotone>
-          </a:blip>
-          <a:stretch/>
-        </a:blipFill>
-        <a:effectLst/>
-      </p:bgPr>
-    </p:bg>
-    <p:spTree>
-      <p:nvGrpSpPr>
-        <p:cNvPr id="1" name=""/>
-        <p:cNvGrpSpPr/>
-        <p:nvPr/>
-      </p:nvGrpSpPr>
-      <p:grpSpPr>
-        <a:xfrm>
-          <a:off x="0" y="0"/>
-          <a:ext cx="0" cy="0"/>
-          <a:chOff x="0" y="0"/>
-          <a:chExt cx="0" cy="0"/>
-        </a:xfrm>
-      </p:grpSpPr>
-      <p:sp useBgFill="1">
-        <p:nvSpPr>
-          <p:cNvPr id="55" name="Rectangle 54">
-            <a:extLst>
-              <a:ext uri="{FF2B5EF4-FFF2-40B4-BE49-F238E27FC236}">
-                <a16:creationId xmlns:a16="http://schemas.microsoft.com/office/drawing/2014/main" id="{0EF2A0DA-AE81-4A45-972E-646AC2870C2F}"/>
-              </a:ext>
-              <a:ext uri="{C183D7F6-B498-43B3-948B-1728B52AA6E4}">
-                <adec:decorative xmlns:adec="http://schemas.microsoft.com/office/drawing/2017/decorative" val="1"/>
-              </a:ext>
-            </a:extLst>
-          </p:cNvPr>
-          <p:cNvSpPr>
-            <a:spLocks noGrp="1" noRot="1" noChangeAspect="1" noMove="1" noResize="1" noEditPoints="1" noAdjustHandles="1" noChangeArrowheads="1" noChangeShapeType="1" noTextEdit="1"/>
-          </p:cNvSpPr>
-          <p:nvPr>
-            <p:extLst>
-              <p:ext uri="{386F3935-93C4-4BCD-93E2-E3B085C9AB24}">
-                <p16:designElem xmlns:p16="http://schemas.microsoft.com/office/powerpoint/2015/main" val="1"/>
-              </p:ext>
-            </p:extLst>
-          </p:nvPr>
-        </p:nvSpPr>
-        <p:spPr>
-          <a:xfrm>
-            <a:off x="0" y="0"/>
-            <a:ext cx="12192000" cy="6858000"/>
-          </a:xfrm>
-          <a:prstGeom prst="rect">
-            <a:avLst/>
-          </a:prstGeom>
-          <a:ln>
-            <a:noFill/>
-          </a:ln>
-        </p:spPr>
-        <p:style>
-          <a:lnRef idx="2">
-            <a:schemeClr val="accent1">
-              <a:shade val="50000"/>
-            </a:schemeClr>
-          </a:lnRef>
-          <a:fillRef idx="1">
-            <a:schemeClr val="accent1"/>
-          </a:fillRef>
-          <a:effectRef idx="0">
-            <a:schemeClr val="accent1"/>
-          </a:effectRef>
-          <a:fontRef idx="minor">
-            <a:schemeClr val="lt1"/>
-          </a:fontRef>
-        </p:style>
-        <p:txBody>
-          <a:bodyPr rtlCol="0" anchor="ctr"/>
-          <a:lstStyle/>
-          <a:p>
-            <a:pPr marL="0" marR="0" lvl="0" indent="0" algn="ctr" defTabSz="914400" rtl="0" eaLnBrk="1" fontAlgn="auto" latinLnBrk="0" hangingPunct="1">
-              <a:lnSpc>
-                <a:spcPct val="100000"/>
-              </a:lnSpc>
-              <a:spcBef>
-                <a:spcPts val="0"/>
-              </a:spcBef>
-              <a:spcAft>
-                <a:spcPts val="0"/>
-              </a:spcAft>
-              <a:buClrTx/>
-              <a:buSzTx/>
-              <a:buFontTx/>
-              <a:buNone/>
-              <a:tabLst/>
-              <a:defRPr/>
-            </a:pPr>
-            <a:endParaRPr kumimoji="0" lang="en-US" sz="1800" b="0" i="0" u="none" strike="noStrike" kern="1200" cap="none" spc="0" normalizeH="0" baseline="0" noProof="0" dirty="0">
-              <a:ln>
-                <a:noFill/>
-              </a:ln>
-              <a:solidFill>
-                <a:prstClr val="white"/>
-              </a:solidFill>
-              <a:effectLst/>
-              <a:uLnTx/>
-              <a:uFillTx/>
-              <a:latin typeface="Goudy Old Style"/>
-              <a:ea typeface="+mn-ea"/>
-              <a:cs typeface="+mn-cs"/>
-            </a:endParaRPr>
-          </a:p>
-        </p:txBody>
-      </p:sp>
-      <p:pic>
-        <p:nvPicPr>
-          <p:cNvPr id="3" name="Picture 2">
-            <a:extLst>
-              <a:ext uri="{FF2B5EF4-FFF2-40B4-BE49-F238E27FC236}">
-                <a16:creationId xmlns:a16="http://schemas.microsoft.com/office/drawing/2014/main" id="{72B2D6DE-C9B5-4678-91EF-77E85F2350DA}"/>
-              </a:ext>
-              <a:ext uri="{C183D7F6-B498-43B3-948B-1728B52AA6E4}">
-                <adec:decorative xmlns:adec="http://schemas.microsoft.com/office/drawing/2017/decorative" val="1"/>
-              </a:ext>
-            </a:extLst>
-          </p:cNvPr>
-          <p:cNvPicPr>
-            <a:picLocks noChangeAspect="1"/>
-          </p:cNvPicPr>
-          <p:nvPr/>
-        </p:nvPicPr>
-        <p:blipFill rotWithShape="1">
-          <a:blip r:embed="rId5">
-            <a:extLst>
-              <a:ext uri="{28A0092B-C50C-407E-A947-70E740481C1C}">
-                <a14:useLocalDpi xmlns:a14="http://schemas.microsoft.com/office/drawing/2010/main" val="0"/>
-              </a:ext>
-            </a:extLst>
-          </a:blip>
-          <a:srcRect b="-1"/>
-          <a:stretch/>
-        </p:blipFill>
-        <p:spPr>
-          <a:xfrm>
-            <a:off x="0" y="11"/>
-            <a:ext cx="6095999" cy="6857989"/>
-          </a:xfrm>
-          <a:prstGeom prst="rect">
-            <a:avLst/>
-          </a:prstGeom>
-        </p:spPr>
-      </p:pic>
-      <p:pic>
-        <p:nvPicPr>
-          <p:cNvPr id="57" name="Picture 56">
-            <a:extLst>
-              <a:ext uri="{FF2B5EF4-FFF2-40B4-BE49-F238E27FC236}">
-                <a16:creationId xmlns:a16="http://schemas.microsoft.com/office/drawing/2014/main" id="{B536FA4E-0152-4E27-91DA-0FC22D1846BB}"/>
-              </a:ext>
-              <a:ext uri="{C183D7F6-B498-43B3-948B-1728B52AA6E4}">
-                <adec:decorative xmlns:adec="http://schemas.microsoft.com/office/drawing/2017/decorative" val="1"/>
-              </a:ext>
-            </a:extLst>
-          </p:cNvPr>
-          <p:cNvPicPr>
-            <a:picLocks noGrp="1" noRot="1" noChangeAspect="1" noMove="1" noResize="1" noEditPoints="1" noAdjustHandles="1" noChangeArrowheads="1" noChangeShapeType="1" noCrop="1"/>
-          </p:cNvPicPr>
-          <p:nvPr>
-            <p:extLst>
-              <p:ext uri="{386F3935-93C4-4BCD-93E2-E3B085C9AB24}">
-                <p16:designElem xmlns:p16="http://schemas.microsoft.com/office/powerpoint/2015/main" val="1"/>
-              </p:ext>
-            </p:extLst>
-          </p:nvPr>
-        </p:nvPicPr>
-        <p:blipFill rotWithShape="1">
-          <a:blip r:embed="rId6">
-            <a:extLst>
-              <a:ext uri="{28A0092B-C50C-407E-A947-70E740481C1C}">
-                <a14:useLocalDpi xmlns:a14="http://schemas.microsoft.com/office/drawing/2010/main" val="0"/>
-              </a:ext>
-            </a:extLst>
-          </a:blip>
-          <a:srcRect/>
-          <a:stretch/>
-        </p:blipFill>
-        <p:spPr>
-          <a:xfrm>
-            <a:off x="6257026" y="1"/>
-            <a:ext cx="5934973" cy="6858000"/>
-          </a:xfrm>
-          <a:prstGeom prst="rect">
-            <a:avLst/>
-          </a:prstGeom>
-        </p:spPr>
-      </p:pic>
-      <p:sp>
-        <p:nvSpPr>
-          <p:cNvPr id="2" name="Title 1">
-            <a:extLst>
-              <a:ext uri="{FF2B5EF4-FFF2-40B4-BE49-F238E27FC236}">
-                <a16:creationId xmlns:a16="http://schemas.microsoft.com/office/drawing/2014/main" id="{89559F60-4CE1-4E2F-86EA-1B60679F1F4A}"/>
-              </a:ext>
-            </a:extLst>
-          </p:cNvPr>
-          <p:cNvSpPr>
-            <a:spLocks noGrp="1"/>
-          </p:cNvSpPr>
-          <p:nvPr>
-            <p:ph type="title"/>
-          </p:nvPr>
-        </p:nvSpPr>
-        <p:spPr>
-          <a:xfrm>
-            <a:off x="6900493" y="609600"/>
-            <a:ext cx="4538124" cy="970450"/>
-          </a:xfrm>
-        </p:spPr>
-        <p:txBody>
-          <a:bodyPr anchor="b">
-            <a:normAutofit fontScale="90000"/>
-          </a:bodyPr>
-          <a:lstStyle/>
-          <a:p>
-            <a:pPr algn="l"/>
-            <a:r>
-              <a:rPr lang="en-US" sz="4000" dirty="0"/>
-              <a:t>Larger Geo area groups	</a:t>
-            </a:r>
-          </a:p>
-        </p:txBody>
-      </p:sp>
-      <p:sp>
-        <p:nvSpPr>
-          <p:cNvPr id="24" name="Content Placeholder 2">
-            <a:extLst>
-              <a:ext uri="{FF2B5EF4-FFF2-40B4-BE49-F238E27FC236}">
-                <a16:creationId xmlns:a16="http://schemas.microsoft.com/office/drawing/2014/main" id="{F260476B-CCA6-412B-A9C5-399C34AE6F05}"/>
-              </a:ext>
-            </a:extLst>
-          </p:cNvPr>
-          <p:cNvSpPr>
-            <a:spLocks noGrp="1"/>
-          </p:cNvSpPr>
-          <p:nvPr>
-            <p:ph idx="1"/>
-          </p:nvPr>
-        </p:nvSpPr>
-        <p:spPr>
-          <a:xfrm>
-            <a:off x="6900493" y="1732449"/>
-            <a:ext cx="4403596" cy="4058751"/>
-          </a:xfrm>
-        </p:spPr>
-        <p:txBody>
-          <a:bodyPr anchor="t">
-            <a:normAutofit/>
-          </a:bodyPr>
-          <a:lstStyle/>
-          <a:p>
-            <a:pPr marL="36900" lvl="0" indent="0">
-              <a:buNone/>
-            </a:pPr>
-            <a:r>
-              <a:rPr lang="en-US" sz="2400" dirty="0"/>
-              <a:t>These area groups are what I used based on the website's regional division, which had 8 regions.</a:t>
-            </a:r>
-          </a:p>
-        </p:txBody>
-      </p:sp>
-      <p:pic>
-        <p:nvPicPr>
-          <p:cNvPr id="4" name="Picture 3">
-            <a:extLst>
-              <a:ext uri="{FF2B5EF4-FFF2-40B4-BE49-F238E27FC236}">
-                <a16:creationId xmlns:a16="http://schemas.microsoft.com/office/drawing/2014/main" id="{58D4697B-C867-44CC-9958-1A8B927FB6B9}"/>
-              </a:ext>
-            </a:extLst>
-          </p:cNvPr>
-          <p:cNvPicPr>
-            <a:picLocks noChangeAspect="1"/>
-          </p:cNvPicPr>
-          <p:nvPr/>
-        </p:nvPicPr>
-        <p:blipFill>
-          <a:blip r:embed="rId7"/>
-          <a:stretch>
-            <a:fillRect/>
-          </a:stretch>
-        </p:blipFill>
-        <p:spPr>
-          <a:xfrm>
-            <a:off x="1138335" y="0"/>
-            <a:ext cx="4431012" cy="3347428"/>
-          </a:xfrm>
-          <a:prstGeom prst="rect">
-            <a:avLst/>
-          </a:prstGeom>
-        </p:spPr>
-      </p:pic>
-      <p:pic>
-        <p:nvPicPr>
-          <p:cNvPr id="5" name="Picture 4">
-            <a:extLst>
-              <a:ext uri="{FF2B5EF4-FFF2-40B4-BE49-F238E27FC236}">
-                <a16:creationId xmlns:a16="http://schemas.microsoft.com/office/drawing/2014/main" id="{1139443C-8AD4-4B53-B7A9-15F2D51EE62C}"/>
-              </a:ext>
-            </a:extLst>
-          </p:cNvPr>
-          <p:cNvPicPr>
-            <a:picLocks noChangeAspect="1"/>
-          </p:cNvPicPr>
-          <p:nvPr/>
-        </p:nvPicPr>
-        <p:blipFill>
-          <a:blip r:embed="rId8"/>
-          <a:stretch>
-            <a:fillRect/>
-          </a:stretch>
-        </p:blipFill>
-        <p:spPr>
-          <a:xfrm>
-            <a:off x="810666" y="3429000"/>
-            <a:ext cx="5086350" cy="3228975"/>
-          </a:xfrm>
-          <a:prstGeom prst="rect">
-            <a:avLst/>
-          </a:prstGeom>
-        </p:spPr>
-      </p:pic>
-    </p:spTree>
-    <p:extLst>
-      <p:ext uri="{BB962C8B-B14F-4D97-AF65-F5344CB8AC3E}">
-        <p14:creationId xmlns:p14="http://schemas.microsoft.com/office/powerpoint/2010/main" val="3937201407"/>
       </p:ext>
     </p:extLst>
   </p:cSld>
@@ -9685,25 +10615,50 @@
 </a:themeOverride>
 </file>
 
-<file path=customXml/item1.xml><?xml version="1.0" encoding="utf-8"?>
-<?mso-contentType ?>
-<FormTemplates xmlns="http://schemas.microsoft.com/sharepoint/v3/contenttype/forms">
-  <Display>DocumentLibraryForm</Display>
-  <Edit>DocumentLibraryForm</Edit>
-  <New>DocumentLibraryForm</New>
-</FormTemplates>
+<file path=ppt/theme/themeOverride7.xml><?xml version="1.0" encoding="utf-8"?>
+<a:themeOverride xmlns:a="http://schemas.openxmlformats.org/drawingml/2006/main">
+  <a:clrScheme name="Green">
+    <a:dk1>
+      <a:sysClr val="windowText" lastClr="000000"/>
+    </a:dk1>
+    <a:lt1>
+      <a:sysClr val="window" lastClr="FFFFFF"/>
+    </a:lt1>
+    <a:dk2>
+      <a:srgbClr val="455F51"/>
+    </a:dk2>
+    <a:lt2>
+      <a:srgbClr val="E3DED1"/>
+    </a:lt2>
+    <a:accent1>
+      <a:srgbClr val="549E39"/>
+    </a:accent1>
+    <a:accent2>
+      <a:srgbClr val="8AB833"/>
+    </a:accent2>
+    <a:accent3>
+      <a:srgbClr val="C0CF3A"/>
+    </a:accent3>
+    <a:accent4>
+      <a:srgbClr val="029676"/>
+    </a:accent4>
+    <a:accent5>
+      <a:srgbClr val="4AB5C4"/>
+    </a:accent5>
+    <a:accent6>
+      <a:srgbClr val="0989B1"/>
+    </a:accent6>
+    <a:hlink>
+      <a:srgbClr val="6B9F25"/>
+    </a:hlink>
+    <a:folHlink>
+      <a:srgbClr val="BA6906"/>
+    </a:folHlink>
+  </a:clrScheme>
+</a:themeOverride>
 </file>
 
-<file path=customXml/item2.xml><?xml version="1.0" encoding="utf-8"?>
-<p:properties xmlns:p="http://schemas.microsoft.com/office/2006/metadata/properties" xmlns:xsi="http://www.w3.org/2001/XMLSchema-instance" xmlns:pc="http://schemas.microsoft.com/office/infopath/2007/PartnerControls">
-  <documentManagement>
-    <Status xmlns="71af3243-3dd4-4a8d-8c0d-dd76da1f02a5">Not started</Status>
-    <MediaServiceKeyPoints xmlns="71af3243-3dd4-4a8d-8c0d-dd76da1f02a5" xsi:nil="true"/>
-  </documentManagement>
-</p:properties>
-</file>
-
-<file path=customXml/item3.xml><?xml version="1.0" encoding="utf-8"?>
+<file path=customXml/item1.xml><?xml version="1.0" encoding="utf-8"?>
 <ct:contentTypeSchema xmlns:ct="http://schemas.microsoft.com/office/2006/metadata/contentType" xmlns:ma="http://schemas.microsoft.com/office/2006/metadata/properties/metaAttributes" ct:_="" ma:_="" ma:contentTypeName="Document" ma:contentTypeID="0x01010079F111ED35F8CC479449609E8A0923A6" ma:contentTypeVersion="12" ma:contentTypeDescription="Create a new document." ma:contentTypeScope="" ma:versionID="a410dd7f93c95333ffa1b60ed6adedd1">
   <xsd:schema xmlns:xsd="http://www.w3.org/2001/XMLSchema" xmlns:xs="http://www.w3.org/2001/XMLSchema" xmlns:p="http://schemas.microsoft.com/office/2006/metadata/properties" xmlns:ns2="71af3243-3dd4-4a8d-8c0d-dd76da1f02a5" xmlns:ns3="16c05727-aa75-4e4a-9b5f-8a80a1165891" targetNamespace="http://schemas.microsoft.com/office/2006/metadata/properties" ma:root="true" ma:fieldsID="a936d9baba76aa3866493feff160faab" ns2:_="" ns3:_="">
     <xsd:import namespace="71af3243-3dd4-4a8d-8c0d-dd76da1f02a5"/>
@@ -9924,25 +10879,25 @@
 </ct:contentTypeSchema>
 </file>
 
-<file path=customXml/itemProps1.xml><?xml version="1.0" encoding="utf-8"?>
-<ds:datastoreItem xmlns:ds="http://schemas.openxmlformats.org/officeDocument/2006/customXml" ds:itemID="{64B270AB-C138-415C-897E-3C24487DECF1}">
-  <ds:schemaRefs>
-    <ds:schemaRef ds:uri="http://schemas.microsoft.com/sharepoint/v3/contenttype/forms"/>
-  </ds:schemaRefs>
-</ds:datastoreItem>
+<file path=customXml/item2.xml><?xml version="1.0" encoding="utf-8"?>
+<p:properties xmlns:p="http://schemas.microsoft.com/office/2006/metadata/properties" xmlns:xsi="http://www.w3.org/2001/XMLSchema-instance" xmlns:pc="http://schemas.microsoft.com/office/infopath/2007/PartnerControls">
+  <documentManagement>
+    <Status xmlns="71af3243-3dd4-4a8d-8c0d-dd76da1f02a5">Not started</Status>
+    <MediaServiceKeyPoints xmlns="71af3243-3dd4-4a8d-8c0d-dd76da1f02a5" xsi:nil="true"/>
+  </documentManagement>
+</p:properties>
 </file>
 
-<file path=customXml/itemProps2.xml><?xml version="1.0" encoding="utf-8"?>
-<ds:datastoreItem xmlns:ds="http://schemas.openxmlformats.org/officeDocument/2006/customXml" ds:itemID="{2C4C00F4-06E9-43E3-AD97-88A857CEFA82}">
-  <ds:schemaRefs>
-    <ds:schemaRef ds:uri="http://schemas.microsoft.com/office/2006/metadata/properties"/>
-    <ds:schemaRef ds:uri="http://schemas.microsoft.com/office/infopath/2007/PartnerControls"/>
-    <ds:schemaRef ds:uri="71af3243-3dd4-4a8d-8c0d-dd76da1f02a5"/>
-  </ds:schemaRefs>
-</ds:datastoreItem>
+<file path=customXml/item3.xml><?xml version="1.0" encoding="utf-8"?>
+<?mso-contentType ?>
+<FormTemplates xmlns="http://schemas.microsoft.com/sharepoint/v3/contenttype/forms">
+  <Display>DocumentLibraryForm</Display>
+  <Edit>DocumentLibraryForm</Edit>
+  <New>DocumentLibraryForm</New>
+</FormTemplates>
 </file>
 
-<file path=customXml/itemProps3.xml><?xml version="1.0" encoding="utf-8"?>
+<file path=customXml/itemProps1.xml><?xml version="1.0" encoding="utf-8"?>
 <ds:datastoreItem xmlns:ds="http://schemas.openxmlformats.org/officeDocument/2006/customXml" ds:itemID="{0585E981-8C91-4205-A0C3-C991F42B4C9E}">
   <ds:schemaRefs>
     <ds:schemaRef ds:uri="http://schemas.microsoft.com/office/2006/metadata/contentType"/>
@@ -9959,4 +10914,22 @@
     <ds:schemaRef ds:uri="http://schemas.microsoft.com/internal/obd"/>
   </ds:schemaRefs>
 </ds:datastoreItem>
+</file>
+
+<file path=customXml/itemProps2.xml><?xml version="1.0" encoding="utf-8"?>
+<ds:datastoreItem xmlns:ds="http://schemas.openxmlformats.org/officeDocument/2006/customXml" ds:itemID="{2C4C00F4-06E9-43E3-AD97-88A857CEFA82}">
+  <ds:schemaRefs>
+    <ds:schemaRef ds:uri="http://schemas.microsoft.com/office/2006/metadata/properties"/>
+    <ds:schemaRef ds:uri="http://schemas.microsoft.com/office/infopath/2007/PartnerControls"/>
+    <ds:schemaRef ds:uri="71af3243-3dd4-4a8d-8c0d-dd76da1f02a5"/>
+  </ds:schemaRefs>
+</ds:datastoreItem>
+</file>
+
+<file path=customXml/itemProps3.xml><?xml version="1.0" encoding="utf-8"?>
+<ds:datastoreItem xmlns:ds="http://schemas.openxmlformats.org/officeDocument/2006/customXml" ds:itemID="{64B270AB-C138-415C-897E-3C24487DECF1}">
+  <ds:schemaRefs>
+    <ds:schemaRef ds:uri="http://schemas.microsoft.com/sharepoint/v3/contenttype/forms"/>
+  </ds:schemaRefs>
+</ds:datastoreItem>
 </file>
</xml_diff>